<commit_message>
what can macros do
</commit_message>
<xml_diff>
--- a/Scala_metaprogramming.pptx
+++ b/Scala_metaprogramming.pptx
@@ -5,7 +5,7 @@
     <p:sldMasterId id="2147483648" r:id="rId1"/>
   </p:sldMasterIdLst>
   <p:notesMasterIdLst>
-    <p:notesMasterId r:id="rId18"/>
+    <p:notesMasterId r:id="rId19"/>
   </p:notesMasterIdLst>
   <p:sldIdLst>
     <p:sldId id="351" r:id="rId2"/>
@@ -18,12 +18,13 @@
     <p:sldId id="461" r:id="rId9"/>
     <p:sldId id="462" r:id="rId10"/>
     <p:sldId id="463" r:id="rId11"/>
-    <p:sldId id="464" r:id="rId12"/>
-    <p:sldId id="465" r:id="rId13"/>
-    <p:sldId id="466" r:id="rId14"/>
-    <p:sldId id="468" r:id="rId15"/>
-    <p:sldId id="467" r:id="rId16"/>
-    <p:sldId id="445" r:id="rId17"/>
+    <p:sldId id="469" r:id="rId12"/>
+    <p:sldId id="464" r:id="rId13"/>
+    <p:sldId id="465" r:id="rId14"/>
+    <p:sldId id="466" r:id="rId15"/>
+    <p:sldId id="468" r:id="rId16"/>
+    <p:sldId id="467" r:id="rId17"/>
+    <p:sldId id="445" r:id="rId18"/>
   </p:sldIdLst>
   <p:sldSz cx="9144000" cy="6858000" type="screen4x3"/>
   <p:notesSz cx="6858000" cy="9144000"/>
@@ -3690,7 +3691,7 @@
         </p:spPr>
         <p:txBody>
           <a:bodyPr>
-            <a:normAutofit fontScale="90000"/>
+            <a:normAutofit/>
           </a:bodyPr>
           <a:lstStyle/>
           <a:p>
@@ -3704,7 +3705,7 @@
                 </a:solidFill>
                 <a:latin typeface="Comic Sans MS"/>
               </a:rPr>
-              <a:t>Metaprogramming beyond macros</a:t>
+              <a:t>What macros can actually do?</a:t>
             </a:r>
             <a:endParaRPr lang="en-US" dirty="0"/>
           </a:p>
@@ -3719,7 +3720,7 @@
         <p:spPr>
           <a:xfrm>
             <a:off x="563672" y="1691014"/>
-            <a:ext cx="7818328" cy="3170099"/>
+            <a:ext cx="7818328" cy="646331"/>
           </a:xfrm>
           <a:prstGeom prst="rect">
             <a:avLst/>
@@ -3737,11 +3738,11 @@
               <a:buChar char="•"/>
             </a:pPr>
             <a:r>
-              <a:rPr lang="en-US" sz="4000" dirty="0" smtClean="0">
+              <a:rPr lang="en-US" dirty="0" smtClean="0">
                 <a:latin typeface="Comic Sans MS" panose="030F0702030302020204" pitchFamily="66" charset="0"/>
                 <a:cs typeface="Consolas" panose="020B0609020204030204" pitchFamily="49" charset="0"/>
               </a:rPr>
-              <a:t>Reflection</a:t>
+              <a:t>When macro is used, Scala code is ran</a:t>
             </a:r>
           </a:p>
           <a:p>
@@ -3750,66 +3751,30 @@
               <a:buChar char="•"/>
             </a:pPr>
             <a:r>
-              <a:rPr lang="en-US" sz="4000" dirty="0" smtClean="0">
+              <a:rPr lang="en-US" dirty="0" smtClean="0">
                 <a:latin typeface="Comic Sans MS" panose="030F0702030302020204" pitchFamily="66" charset="0"/>
                 <a:cs typeface="Consolas" panose="020B0609020204030204" pitchFamily="49" charset="0"/>
               </a:rPr>
-              <a:t>Compiler plugins</a:t>
-            </a:r>
-          </a:p>
-          <a:p>
-            <a:pPr marL="285750" indent="-285750">
-              <a:buFont typeface="Arial" panose="020B0604020202020204" pitchFamily="34" charset="0"/>
-              <a:buChar char="•"/>
-            </a:pPr>
-            <a:r>
-              <a:rPr lang="en-US" sz="4000" dirty="0" smtClean="0">
+              <a:t>TODO a </a:t>
+            </a:r>
+            <a:r>
+              <a:rPr lang="en-US" smtClean="0">
                 <a:latin typeface="Comic Sans MS" panose="030F0702030302020204" pitchFamily="66" charset="0"/>
                 <a:cs typeface="Consolas" panose="020B0609020204030204" pitchFamily="49" charset="0"/>
               </a:rPr>
-              <a:t>Fork the Scala compiler</a:t>
-            </a:r>
-          </a:p>
-          <a:p>
-            <a:pPr marL="285750" indent="-285750">
-              <a:buFont typeface="Arial" panose="020B0604020202020204" pitchFamily="34" charset="0"/>
-              <a:buChar char="•"/>
-            </a:pPr>
-            <a:endParaRPr lang="en-US" sz="4000" dirty="0" smtClean="0">
+              <a:t>good picture</a:t>
+            </a:r>
+            <a:endParaRPr lang="en-GB" dirty="0">
               <a:latin typeface="Comic Sans MS" panose="030F0702030302020204" pitchFamily="66" charset="0"/>
               <a:cs typeface="Consolas" panose="020B0609020204030204" pitchFamily="49" charset="0"/>
             </a:endParaRPr>
           </a:p>
-          <a:p>
-            <a:pPr marL="285750" indent="-285750">
-              <a:buFont typeface="Arial" panose="020B0604020202020204" pitchFamily="34" charset="0"/>
-              <a:buChar char="•"/>
-            </a:pPr>
-            <a:r>
-              <a:rPr lang="en-US" sz="4000" dirty="0">
-                <a:latin typeface="Comic Sans MS" panose="030F0702030302020204" pitchFamily="66" charset="0"/>
-                <a:cs typeface="Consolas" panose="020B0609020204030204" pitchFamily="49" charset="0"/>
-              </a:rPr>
-              <a:t>SBT plugins … sort </a:t>
-            </a:r>
-            <a:r>
-              <a:rPr lang="en-US" sz="4000" dirty="0" smtClean="0">
-                <a:latin typeface="Comic Sans MS" panose="030F0702030302020204" pitchFamily="66" charset="0"/>
-                <a:cs typeface="Consolas" panose="020B0609020204030204" pitchFamily="49" charset="0"/>
-              </a:rPr>
-              <a:t>of</a:t>
-            </a:r>
-            <a:endParaRPr lang="en-US" sz="4000" dirty="0">
-              <a:latin typeface="Comic Sans MS" panose="030F0702030302020204" pitchFamily="66" charset="0"/>
-              <a:cs typeface="Consolas" panose="020B0609020204030204" pitchFamily="49" charset="0"/>
-            </a:endParaRPr>
-          </a:p>
         </p:txBody>
       </p:sp>
     </p:spTree>
     <p:extLst>
       <p:ext uri="{BB962C8B-B14F-4D97-AF65-F5344CB8AC3E}">
-        <p14:creationId xmlns:p14="http://schemas.microsoft.com/office/powerpoint/2010/main" val="538566248"/>
+        <p14:creationId xmlns:p14="http://schemas.microsoft.com/office/powerpoint/2010/main" val="4167151408"/>
       </p:ext>
     </p:extLst>
   </p:cSld>
@@ -3861,7 +3826,7 @@
         </p:spPr>
         <p:txBody>
           <a:bodyPr>
-            <a:normAutofit/>
+            <a:normAutofit fontScale="90000"/>
           </a:bodyPr>
           <a:lstStyle/>
           <a:p>
@@ -3875,16 +3840,9 @@
                 </a:solidFill>
                 <a:latin typeface="Comic Sans MS"/>
               </a:rPr>
-              <a:t>Reflection in Scala</a:t>
-            </a:r>
-            <a:endParaRPr lang="en-US" dirty="0">
-              <a:solidFill>
-                <a:schemeClr val="bg1">
-                  <a:lumMod val="50000"/>
-                </a:schemeClr>
-              </a:solidFill>
-              <a:latin typeface="Comic Sans MS"/>
-            </a:endParaRPr>
+              <a:t>Metaprogramming beyond macros</a:t>
+            </a:r>
+            <a:endParaRPr lang="en-US" dirty="0"/>
           </a:p>
         </p:txBody>
       </p:sp>
@@ -3897,7 +3855,7 @@
         <p:spPr>
           <a:xfrm>
             <a:off x="563672" y="1691014"/>
-            <a:ext cx="7818328" cy="369332"/>
+            <a:ext cx="7818328" cy="3170099"/>
           </a:xfrm>
           <a:prstGeom prst="rect">
             <a:avLst/>
@@ -3915,23 +3873,79 @@
               <a:buChar char="•"/>
             </a:pPr>
             <a:r>
-              <a:rPr lang="lv-LV" dirty="0" smtClean="0">
+              <a:rPr lang="en-US" sz="4000" dirty="0" smtClean="0">
                 <a:latin typeface="Comic Sans MS" panose="030F0702030302020204" pitchFamily="66" charset="0"/>
                 <a:cs typeface="Consolas" panose="020B0609020204030204" pitchFamily="49" charset="0"/>
               </a:rPr>
-              <a:t>TODO</a:t>
-            </a:r>
-            <a:endParaRPr lang="en-GB" dirty="0">
+              <a:t>Reflection</a:t>
+            </a:r>
+          </a:p>
+          <a:p>
+            <a:pPr marL="285750" indent="-285750">
+              <a:buFont typeface="Arial" panose="020B0604020202020204" pitchFamily="34" charset="0"/>
+              <a:buChar char="•"/>
+            </a:pPr>
+            <a:r>
+              <a:rPr lang="en-US" sz="4000" dirty="0" smtClean="0">
+                <a:latin typeface="Comic Sans MS" panose="030F0702030302020204" pitchFamily="66" charset="0"/>
+                <a:cs typeface="Consolas" panose="020B0609020204030204" pitchFamily="49" charset="0"/>
+              </a:rPr>
+              <a:t>Compiler plugins</a:t>
+            </a:r>
+          </a:p>
+          <a:p>
+            <a:pPr marL="285750" indent="-285750">
+              <a:buFont typeface="Arial" panose="020B0604020202020204" pitchFamily="34" charset="0"/>
+              <a:buChar char="•"/>
+            </a:pPr>
+            <a:r>
+              <a:rPr lang="en-US" sz="4000" dirty="0" smtClean="0">
+                <a:latin typeface="Comic Sans MS" panose="030F0702030302020204" pitchFamily="66" charset="0"/>
+                <a:cs typeface="Consolas" panose="020B0609020204030204" pitchFamily="49" charset="0"/>
+              </a:rPr>
+              <a:t>Fork the Scala compiler</a:t>
+            </a:r>
+          </a:p>
+          <a:p>
+            <a:pPr marL="285750" indent="-285750">
+              <a:buFont typeface="Arial" panose="020B0604020202020204" pitchFamily="34" charset="0"/>
+              <a:buChar char="•"/>
+            </a:pPr>
+            <a:endParaRPr lang="en-US" sz="4000" dirty="0" smtClean="0">
               <a:latin typeface="Comic Sans MS" panose="030F0702030302020204" pitchFamily="66" charset="0"/>
               <a:cs typeface="Consolas" panose="020B0609020204030204" pitchFamily="49" charset="0"/>
             </a:endParaRPr>
           </a:p>
+          <a:p>
+            <a:pPr marL="285750" indent="-285750">
+              <a:buFont typeface="Arial" panose="020B0604020202020204" pitchFamily="34" charset="0"/>
+              <a:buChar char="•"/>
+            </a:pPr>
+            <a:r>
+              <a:rPr lang="en-US" sz="4000" dirty="0">
+                <a:latin typeface="Comic Sans MS" panose="030F0702030302020204" pitchFamily="66" charset="0"/>
+                <a:cs typeface="Consolas" panose="020B0609020204030204" pitchFamily="49" charset="0"/>
+              </a:rPr>
+              <a:t>SBT plugins … sort </a:t>
+            </a:r>
+            <a:r>
+              <a:rPr lang="en-US" sz="4000" dirty="0" smtClean="0">
+                <a:latin typeface="Comic Sans MS" panose="030F0702030302020204" pitchFamily="66" charset="0"/>
+                <a:cs typeface="Consolas" panose="020B0609020204030204" pitchFamily="49" charset="0"/>
+              </a:rPr>
+              <a:t>of</a:t>
+            </a:r>
+            <a:endParaRPr lang="en-US" sz="4000" dirty="0">
+              <a:latin typeface="Comic Sans MS" panose="030F0702030302020204" pitchFamily="66" charset="0"/>
+              <a:cs typeface="Consolas" panose="020B0609020204030204" pitchFamily="49" charset="0"/>
+            </a:endParaRPr>
+          </a:p>
         </p:txBody>
       </p:sp>
     </p:spTree>
     <p:extLst>
       <p:ext uri="{BB962C8B-B14F-4D97-AF65-F5344CB8AC3E}">
-        <p14:creationId xmlns:p14="http://schemas.microsoft.com/office/powerpoint/2010/main" val="224215076"/>
+        <p14:creationId xmlns:p14="http://schemas.microsoft.com/office/powerpoint/2010/main" val="538566248"/>
       </p:ext>
     </p:extLst>
   </p:cSld>
@@ -3997,7 +4011,7 @@
                 </a:solidFill>
                 <a:latin typeface="Comic Sans MS"/>
               </a:rPr>
-              <a:t>Compiler plugins</a:t>
+              <a:t>Reflection in Scala</a:t>
             </a:r>
             <a:endParaRPr lang="en-US" dirty="0">
               <a:solidFill>
@@ -4053,7 +4067,7 @@
     </p:spTree>
     <p:extLst>
       <p:ext uri="{BB962C8B-B14F-4D97-AF65-F5344CB8AC3E}">
-        <p14:creationId xmlns:p14="http://schemas.microsoft.com/office/powerpoint/2010/main" val="3385901564"/>
+        <p14:creationId xmlns:p14="http://schemas.microsoft.com/office/powerpoint/2010/main" val="224215076"/>
       </p:ext>
     </p:extLst>
   </p:cSld>
@@ -4119,7 +4133,7 @@
                 </a:solidFill>
                 <a:latin typeface="Comic Sans MS"/>
               </a:rPr>
-              <a:t>Fork the Scala compiler</a:t>
+              <a:t>Compiler plugins</a:t>
             </a:r>
             <a:endParaRPr lang="en-US" dirty="0">
               <a:solidFill>
@@ -4175,7 +4189,7 @@
     </p:spTree>
     <p:extLst>
       <p:ext uri="{BB962C8B-B14F-4D97-AF65-F5344CB8AC3E}">
-        <p14:creationId xmlns:p14="http://schemas.microsoft.com/office/powerpoint/2010/main" val="3257364419"/>
+        <p14:creationId xmlns:p14="http://schemas.microsoft.com/office/powerpoint/2010/main" val="3385901564"/>
       </p:ext>
     </p:extLst>
   </p:cSld>
@@ -4241,6 +4255,128 @@
                 </a:solidFill>
                 <a:latin typeface="Comic Sans MS"/>
               </a:rPr>
+              <a:t>Fork the Scala compiler</a:t>
+            </a:r>
+            <a:endParaRPr lang="en-US" dirty="0">
+              <a:solidFill>
+                <a:schemeClr val="bg1">
+                  <a:lumMod val="50000"/>
+                </a:schemeClr>
+              </a:solidFill>
+              <a:latin typeface="Comic Sans MS"/>
+            </a:endParaRPr>
+          </a:p>
+        </p:txBody>
+      </p:sp>
+      <p:sp>
+        <p:nvSpPr>
+          <p:cNvPr id="4" name="TextBox 3"/>
+          <p:cNvSpPr txBox="1"/>
+          <p:nvPr/>
+        </p:nvSpPr>
+        <p:spPr>
+          <a:xfrm>
+            <a:off x="563672" y="1691014"/>
+            <a:ext cx="7818328" cy="369332"/>
+          </a:xfrm>
+          <a:prstGeom prst="rect">
+            <a:avLst/>
+          </a:prstGeom>
+          <a:noFill/>
+        </p:spPr>
+        <p:txBody>
+          <a:bodyPr wrap="square" rtlCol="0">
+            <a:spAutoFit/>
+          </a:bodyPr>
+          <a:lstStyle/>
+          <a:p>
+            <a:pPr marL="285750" indent="-285750">
+              <a:buFont typeface="Arial" panose="020B0604020202020204" pitchFamily="34" charset="0"/>
+              <a:buChar char="•"/>
+            </a:pPr>
+            <a:r>
+              <a:rPr lang="lv-LV" dirty="0" smtClean="0">
+                <a:latin typeface="Comic Sans MS" panose="030F0702030302020204" pitchFamily="66" charset="0"/>
+                <a:cs typeface="Consolas" panose="020B0609020204030204" pitchFamily="49" charset="0"/>
+              </a:rPr>
+              <a:t>TODO</a:t>
+            </a:r>
+            <a:endParaRPr lang="en-GB" dirty="0">
+              <a:latin typeface="Comic Sans MS" panose="030F0702030302020204" pitchFamily="66" charset="0"/>
+              <a:cs typeface="Consolas" panose="020B0609020204030204" pitchFamily="49" charset="0"/>
+            </a:endParaRPr>
+          </a:p>
+        </p:txBody>
+      </p:sp>
+    </p:spTree>
+    <p:extLst>
+      <p:ext uri="{BB962C8B-B14F-4D97-AF65-F5344CB8AC3E}">
+        <p14:creationId xmlns:p14="http://schemas.microsoft.com/office/powerpoint/2010/main" val="3257364419"/>
+      </p:ext>
+    </p:extLst>
+  </p:cSld>
+  <p:clrMapOvr>
+    <a:masterClrMapping/>
+  </p:clrMapOvr>
+  <p:timing>
+    <p:tnLst>
+      <p:par>
+        <p:cTn id="1" dur="indefinite" restart="never" nodeType="tmRoot"/>
+      </p:par>
+    </p:tnLst>
+  </p:timing>
+</p:sld>
+</file>
+
+<file path=ppt/slides/slide16.xml><?xml version="1.0" encoding="utf-8"?>
+<p:sld xmlns:a="http://schemas.openxmlformats.org/drawingml/2006/main" xmlns:r="http://schemas.openxmlformats.org/officeDocument/2006/relationships" xmlns:p="http://schemas.openxmlformats.org/presentationml/2006/main">
+  <p:cSld>
+    <p:spTree>
+      <p:nvGrpSpPr>
+        <p:cNvPr id="1" name=""/>
+        <p:cNvGrpSpPr/>
+        <p:nvPr/>
+      </p:nvGrpSpPr>
+      <p:grpSpPr>
+        <a:xfrm>
+          <a:off x="0" y="0"/>
+          <a:ext cx="0" cy="0"/>
+          <a:chOff x="0" y="0"/>
+          <a:chExt cx="0" cy="0"/>
+        </a:xfrm>
+      </p:grpSpPr>
+      <p:sp>
+        <p:nvSpPr>
+          <p:cNvPr id="13" name="Title 1"/>
+          <p:cNvSpPr>
+            <a:spLocks noGrp="1"/>
+          </p:cNvSpPr>
+          <p:nvPr>
+            <p:ph type="title"/>
+          </p:nvPr>
+        </p:nvSpPr>
+        <p:spPr>
+          <a:xfrm>
+            <a:off x="457200" y="274638"/>
+            <a:ext cx="8229600" cy="1143000"/>
+          </a:xfrm>
+        </p:spPr>
+        <p:txBody>
+          <a:bodyPr>
+            <a:normAutofit/>
+          </a:bodyPr>
+          <a:lstStyle/>
+          <a:p>
+            <a:pPr algn="l"/>
+            <a:r>
+              <a:rPr lang="en-US" dirty="0" smtClean="0">
+                <a:solidFill>
+                  <a:schemeClr val="bg1">
+                    <a:lumMod val="50000"/>
+                  </a:schemeClr>
+                </a:solidFill>
+                <a:latin typeface="Comic Sans MS"/>
+              </a:rPr>
               <a:t>Build tool plugins</a:t>
             </a:r>
             <a:endParaRPr lang="en-US" dirty="0">
@@ -4314,7 +4450,7 @@
 </p:sld>
 </file>
 
-<file path=ppt/slides/slide16.xml><?xml version="1.0" encoding="utf-8"?>
+<file path=ppt/slides/slide17.xml><?xml version="1.0" encoding="utf-8"?>
 <p:sld xmlns:a="http://schemas.openxmlformats.org/drawingml/2006/main" xmlns:r="http://schemas.openxmlformats.org/officeDocument/2006/relationships" xmlns:p="http://schemas.openxmlformats.org/presentationml/2006/main">
   <p:cSld>
     <p:spTree>

</xml_diff>